<commit_message>
Update powerpoint and add alert to transfer button
</commit_message>
<xml_diff>
--- a/Project Docs/Documents/MidtermDemo.pptx
+++ b/Project Docs/Documents/MidtermDemo.pptx
@@ -114,6 +114,11 @@
       </a:defRPr>
     </a:lvl9pPr>
   </p:defaultTextStyle>
+  <p:extLst>
+    <p:ext uri="{EFAFB233-063F-42B5-8137-9DF3F51BA10A}">
+      <p15:sldGuideLst xmlns:p15="http://schemas.microsoft.com/office/powerpoint/2012/main"/>
+    </p:ext>
+  </p:extLst>
 </p:presentation>
 </file>
 
@@ -4745,23 +4750,25 @@
             </a:r>
           </a:p>
           <a:p>
-            <a:pPr marL="914400" lvl="2" indent="-457200">
-              <a:buFont typeface="+mj-lt"/>
-              <a:buAutoNum type="arabicPeriod"/>
-            </a:pPr>
+            <a:pPr lvl="2"/>
             <a:r>
               <a:rPr lang="en-US" sz="2400" dirty="0"/>
-              <a:t>With initial means selected by size of its bin</a:t>
-            </a:r>
-          </a:p>
-          <a:p>
-            <a:pPr marL="914400" lvl="2" indent="-457200">
-              <a:buFont typeface="+mj-lt"/>
-              <a:buAutoNum type="arabicPeriod"/>
-            </a:pPr>
+              <a:t>With initial means selected by size of </a:t>
+            </a:r>
+            <a:r>
+              <a:rPr lang="en-US" sz="2400"/>
+              <a:t>its bin</a:t>
+            </a:r>
+          </a:p>
+          <a:p>
+            <a:pPr lvl="2"/>
+            <a:r>
+              <a:rPr lang="en-US" sz="2400"/>
+              <a:t>With </a:t>
+            </a:r>
             <a:r>
               <a:rPr lang="en-US" sz="2400" dirty="0"/>
-              <a:t>With 6</a:t>
+              <a:t>6</a:t>
             </a:r>
             <a:r>
               <a:rPr lang="en-US" sz="2400" baseline="30000" dirty="0"/>

</xml_diff>

<commit_message>
Transfer without monotomic luminance
</commit_message>
<xml_diff>
--- a/Project Docs/Documents/MidtermDemo.pptx
+++ b/Project Docs/Documents/MidtermDemo.pptx
@@ -204,7 +204,7 @@
           <a:p>
             <a:fld id="{F684C3C1-2449-4581-8F44-864BF4A12D32}" type="datetimeFigureOut">
               <a:rPr lang="en-US" smtClean="0"/>
-              <a:t>4/4/2018</a:t>
+              <a:t>4/5/2018</a:t>
             </a:fld>
             <a:endParaRPr lang="en-US"/>
           </a:p>
@@ -1123,7 +1123,7 @@
           <a:p>
             <a:fld id="{1887F0D2-F1C5-4328-A17B-292F23E77B9F}" type="datetimeFigureOut">
               <a:rPr lang="en-US" smtClean="0"/>
-              <a:t>4/4/2018</a:t>
+              <a:t>4/5/2018</a:t>
             </a:fld>
             <a:endParaRPr lang="en-US"/>
           </a:p>
@@ -1293,7 +1293,7 @@
           <a:p>
             <a:fld id="{1887F0D2-F1C5-4328-A17B-292F23E77B9F}" type="datetimeFigureOut">
               <a:rPr lang="en-US" smtClean="0"/>
-              <a:t>4/4/2018</a:t>
+              <a:t>4/5/2018</a:t>
             </a:fld>
             <a:endParaRPr lang="en-US"/>
           </a:p>
@@ -1473,7 +1473,7 @@
           <a:p>
             <a:fld id="{1887F0D2-F1C5-4328-A17B-292F23E77B9F}" type="datetimeFigureOut">
               <a:rPr lang="en-US" smtClean="0"/>
-              <a:t>4/4/2018</a:t>
+              <a:t>4/5/2018</a:t>
             </a:fld>
             <a:endParaRPr lang="en-US"/>
           </a:p>
@@ -1643,7 +1643,7 @@
           <a:p>
             <a:fld id="{1887F0D2-F1C5-4328-A17B-292F23E77B9F}" type="datetimeFigureOut">
               <a:rPr lang="en-US" smtClean="0"/>
-              <a:t>4/4/2018</a:t>
+              <a:t>4/5/2018</a:t>
             </a:fld>
             <a:endParaRPr lang="en-US"/>
           </a:p>
@@ -1911,7 +1911,7 @@
           <a:p>
             <a:fld id="{1887F0D2-F1C5-4328-A17B-292F23E77B9F}" type="datetimeFigureOut">
               <a:rPr lang="en-US" smtClean="0"/>
-              <a:t>4/4/2018</a:t>
+              <a:t>4/5/2018</a:t>
             </a:fld>
             <a:endParaRPr lang="en-US"/>
           </a:p>
@@ -2143,7 +2143,7 @@
           <a:p>
             <a:fld id="{1887F0D2-F1C5-4328-A17B-292F23E77B9F}" type="datetimeFigureOut">
               <a:rPr lang="en-US" smtClean="0"/>
-              <a:t>4/4/2018</a:t>
+              <a:t>4/5/2018</a:t>
             </a:fld>
             <a:endParaRPr lang="en-US"/>
           </a:p>
@@ -2502,7 +2502,7 @@
           <a:p>
             <a:fld id="{1887F0D2-F1C5-4328-A17B-292F23E77B9F}" type="datetimeFigureOut">
               <a:rPr lang="en-US" smtClean="0"/>
-              <a:t>4/4/2018</a:t>
+              <a:t>4/5/2018</a:t>
             </a:fld>
             <a:endParaRPr lang="en-US"/>
           </a:p>
@@ -2643,7 +2643,7 @@
           <a:p>
             <a:fld id="{1887F0D2-F1C5-4328-A17B-292F23E77B9F}" type="datetimeFigureOut">
               <a:rPr lang="en-US" smtClean="0"/>
-              <a:t>4/4/2018</a:t>
+              <a:t>4/5/2018</a:t>
             </a:fld>
             <a:endParaRPr lang="en-US"/>
           </a:p>
@@ -2738,7 +2738,7 @@
           <a:p>
             <a:fld id="{1887F0D2-F1C5-4328-A17B-292F23E77B9F}" type="datetimeFigureOut">
               <a:rPr lang="en-US" smtClean="0"/>
-              <a:t>4/4/2018</a:t>
+              <a:t>4/5/2018</a:t>
             </a:fld>
             <a:endParaRPr lang="en-US"/>
           </a:p>
@@ -3095,7 +3095,7 @@
           <a:p>
             <a:fld id="{1887F0D2-F1C5-4328-A17B-292F23E77B9F}" type="datetimeFigureOut">
               <a:rPr lang="en-US" smtClean="0"/>
-              <a:t>4/4/2018</a:t>
+              <a:t>4/5/2018</a:t>
             </a:fld>
             <a:endParaRPr lang="en-US"/>
           </a:p>
@@ -3452,7 +3452,7 @@
           <a:p>
             <a:fld id="{1887F0D2-F1C5-4328-A17B-292F23E77B9F}" type="datetimeFigureOut">
               <a:rPr lang="en-US" smtClean="0"/>
-              <a:t>4/4/2018</a:t>
+              <a:t>4/5/2018</a:t>
             </a:fld>
             <a:endParaRPr lang="en-US"/>
           </a:p>
@@ -3693,7 +3693,7 @@
           <a:p>
             <a:fld id="{1887F0D2-F1C5-4328-A17B-292F23E77B9F}" type="datetimeFigureOut">
               <a:rPr lang="en-US" smtClean="0"/>
-              <a:t>4/4/2018</a:t>
+              <a:t>4/5/2018</a:t>
             </a:fld>
             <a:endParaRPr lang="en-US"/>
           </a:p>
@@ -4163,12 +4163,14 @@
         </p:nvSpPr>
         <p:spPr/>
         <p:txBody>
-          <a:bodyPr/>
+          <a:bodyPr>
+            <a:normAutofit fontScale="90000"/>
+          </a:bodyPr>
           <a:lstStyle/>
           <a:p>
             <a:r>
               <a:rPr lang="en-US" dirty="0"/>
-              <a:t>Palette-Based Recoloring</a:t>
+              <a:t>Palette-Based Photo Recoloring</a:t>
             </a:r>
             <a:br>
               <a:rPr lang="en-US" dirty="0"/>
@@ -4306,7 +4308,7 @@
           <a:lstStyle/>
           <a:p>
             <a:pPr algn="ctr"/>
-            <a:endParaRPr lang="en-US"/>
+            <a:endParaRPr lang="en-US" dirty="0"/>
           </a:p>
         </p:txBody>
       </p:sp>
@@ -4366,7 +4368,7 @@
           <a:lstStyle/>
           <a:p>
             <a:pPr algn="ctr"/>
-            <a:endParaRPr lang="en-US"/>
+            <a:endParaRPr lang="en-US" dirty="0"/>
           </a:p>
         </p:txBody>
       </p:sp>
@@ -4567,7 +4569,7 @@
           <a:lstStyle/>
           <a:p>
             <a:r>
-              <a:rPr lang="en-US"/>
+              <a:rPr lang="en-US" dirty="0"/>
               <a:t>Lab Color Space</a:t>
             </a:r>
           </a:p>

</xml_diff>